<commit_message>
added plans for timing
</commit_message>
<xml_diff>
--- a/FindAR/WebinarPresentation/blank-ppt.pptx
+++ b/FindAR/WebinarPresentation/blank-ppt.pptx
@@ -5,7 +5,7 @@
     <p:sldMasterId id="2147483648" r:id="rId1"/>
   </p:sldMasterIdLst>
   <p:sldIdLst>
-    <p:sldId id="256" r:id="rId2"/>
+    <p:sldId id="257" r:id="rId2"/>
   </p:sldIdLst>
   <p:sldSz cx="12192000" cy="6858000"/>
   <p:notesSz cx="6858000" cy="9144000"/>
@@ -104,6 +104,11 @@
       </a:defRPr>
     </a:lvl9pPr>
   </p:defaultTextStyle>
+  <p:extLst>
+    <p:ext uri="{EFAFB233-063F-42B5-8137-9DF3F51BA10A}">
+      <p15:sldGuideLst xmlns:p15="http://schemas.microsoft.com/office/powerpoint/2012/main"/>
+    </p:ext>
+  </p:extLst>
 </p:presentation>
 </file>
 
@@ -3326,55 +3331,126 @@
           <p:cNvPr id="2" name="Title 1">
             <a:extLst>
               <a:ext uri="{FF2B5EF4-FFF2-40B4-BE49-F238E27FC236}">
-                <a16:creationId xmlns:a16="http://schemas.microsoft.com/office/drawing/2014/main" id="{4CD6A09F-91C6-4C3E-90CE-F36FF35EFF43}"/>
-              </a:ext>
-            </a:extLst>
-          </p:cNvPr>
-          <p:cNvSpPr>
-            <a:spLocks noGrp="1"/>
-          </p:cNvSpPr>
-          <p:nvPr>
-            <p:ph type="ctrTitle"/>
-          </p:nvPr>
-        </p:nvSpPr>
-        <p:spPr/>
-        <p:txBody>
-          <a:bodyPr/>
-          <a:lstStyle/>
-          <a:p>
-            <a:endParaRPr lang="en-US"/>
-          </a:p>
-        </p:txBody>
-      </p:sp>
-      <p:sp>
-        <p:nvSpPr>
-          <p:cNvPr id="3" name="Subtitle 2">
-            <a:extLst>
-              <a:ext uri="{FF2B5EF4-FFF2-40B4-BE49-F238E27FC236}">
-                <a16:creationId xmlns:a16="http://schemas.microsoft.com/office/drawing/2014/main" id="{4104C243-7AB4-4CCD-90F2-3C9710B89049}"/>
-              </a:ext>
-            </a:extLst>
-          </p:cNvPr>
-          <p:cNvSpPr>
-            <a:spLocks noGrp="1"/>
-          </p:cNvSpPr>
-          <p:nvPr>
-            <p:ph type="subTitle" idx="1"/>
-          </p:nvPr>
-        </p:nvSpPr>
-        <p:spPr/>
-        <p:txBody>
-          <a:bodyPr/>
-          <a:lstStyle/>
-          <a:p>
-            <a:endParaRPr lang="en-US"/>
+                <a16:creationId xmlns:a16="http://schemas.microsoft.com/office/drawing/2014/main" id="{802B1EF5-B05A-403A-BB4C-C73E8C1FB640}"/>
+              </a:ext>
+            </a:extLst>
+          </p:cNvPr>
+          <p:cNvSpPr>
+            <a:spLocks noGrp="1"/>
+          </p:cNvSpPr>
+          <p:nvPr>
+            <p:ph type="title"/>
+          </p:nvPr>
+        </p:nvSpPr>
+        <p:spPr/>
+        <p:txBody>
+          <a:bodyPr/>
+          <a:lstStyle/>
+          <a:p>
+            <a:r>
+              <a:rPr lang="en-US" dirty="0"/>
+              <a:t>Plan for presentation</a:t>
+            </a:r>
+          </a:p>
+        </p:txBody>
+      </p:sp>
+      <p:sp>
+        <p:nvSpPr>
+          <p:cNvPr id="3" name="Content Placeholder 2">
+            <a:extLst>
+              <a:ext uri="{FF2B5EF4-FFF2-40B4-BE49-F238E27FC236}">
+                <a16:creationId xmlns:a16="http://schemas.microsoft.com/office/drawing/2014/main" id="{A355A5C7-19A7-40A8-AEE8-7A1430721A0A}"/>
+              </a:ext>
+            </a:extLst>
+          </p:cNvPr>
+          <p:cNvSpPr>
+            <a:spLocks noGrp="1"/>
+          </p:cNvSpPr>
+          <p:nvPr>
+            <p:ph idx="1"/>
+          </p:nvPr>
+        </p:nvSpPr>
+        <p:spPr/>
+        <p:txBody>
+          <a:bodyPr>
+            <a:normAutofit lnSpcReduction="10000"/>
+          </a:bodyPr>
+          <a:lstStyle/>
+          <a:p>
+            <a:r>
+              <a:rPr lang="en-US" dirty="0"/>
+              <a:t>Context (10 min)</a:t>
+            </a:r>
+          </a:p>
+          <a:p>
+            <a:pPr lvl="1"/>
+            <a:r>
+              <a:rPr lang="en-US" dirty="0"/>
+              <a:t>Intro to project</a:t>
+            </a:r>
+          </a:p>
+          <a:p>
+            <a:pPr lvl="1"/>
+            <a:r>
+              <a:rPr lang="en-US" dirty="0"/>
+              <a:t>What’s the problem</a:t>
+            </a:r>
+          </a:p>
+          <a:p>
+            <a:r>
+              <a:rPr lang="en-US" dirty="0"/>
+              <a:t>Data (15 min)</a:t>
+            </a:r>
+          </a:p>
+          <a:p>
+            <a:pPr lvl="1"/>
+            <a:r>
+              <a:rPr lang="en-US" dirty="0"/>
+              <a:t>How we dealt with the dirtiness of the data</a:t>
+            </a:r>
+          </a:p>
+          <a:p>
+            <a:pPr lvl="1"/>
+            <a:r>
+              <a:rPr lang="en-US" dirty="0"/>
+              <a:t>Explain taxonomy</a:t>
+            </a:r>
+          </a:p>
+          <a:p>
+            <a:pPr lvl="1"/>
+            <a:r>
+              <a:rPr lang="en-US" dirty="0"/>
+              <a:t>Explain classification model</a:t>
+            </a:r>
+          </a:p>
+          <a:p>
+            <a:pPr lvl="1"/>
+            <a:r>
+              <a:rPr lang="en-US" dirty="0"/>
+              <a:t>Explain similarity model</a:t>
+            </a:r>
+          </a:p>
+          <a:p>
+            <a:r>
+              <a:rPr lang="en-US" dirty="0"/>
+              <a:t>Demo (10 min)</a:t>
+            </a:r>
+          </a:p>
+          <a:p>
+            <a:r>
+              <a:rPr lang="en-US" dirty="0"/>
+              <a:t>Future Directions (5 min)</a:t>
+            </a:r>
+          </a:p>
+          <a:p>
+            <a:endParaRPr lang="en-US" dirty="0"/>
           </a:p>
         </p:txBody>
       </p:sp>
     </p:spTree>
     <p:extLst>
       <p:ext uri="{BB962C8B-B14F-4D97-AF65-F5344CB8AC3E}">
-        <p14:creationId xmlns:p14="http://schemas.microsoft.com/office/powerpoint/2010/main" val="1614526794"/>
+        <p14:creationId xmlns:p14="http://schemas.microsoft.com/office/powerpoint/2010/main" val="3752786237"/>
       </p:ext>
     </p:extLst>
   </p:cSld>

</xml_diff>